<commit_message>
Users table and Activity Users added, setScore and getScore methods updated with new parameter (userID). GlobalUser Class contains username and id. Remains change name and delete user
</commit_message>
<xml_diff>
--- a/Diseño Botones.pptx
+++ b/Diseño Botones.pptx
@@ -104,6 +104,11 @@
       </a:defRPr>
     </a:lvl9pPr>
   </p:defaultTextStyle>
+  <p:extLst>
+    <p:ext uri="{EFAFB233-063F-42B5-8137-9DF3F51BA10A}">
+      <p15:sldGuideLst xmlns:p15="http://schemas.microsoft.com/office/powerpoint/2012/main"/>
+    </p:ext>
+  </p:extLst>
 </p:presentation>
 </file>
 
@@ -3356,8 +3361,8 @@
         </p:nvSpPr>
         <p:spPr>
           <a:xfrm>
-            <a:off x="5529263" y="3224213"/>
-            <a:ext cx="655638" cy="204787"/>
+            <a:off x="5330801" y="3365898"/>
+            <a:ext cx="1100956" cy="377427"/>
           </a:xfrm>
           <a:prstGeom prst="roundRect">
             <a:avLst/>
@@ -3399,15 +3404,15 @@
               </a:spcAft>
             </a:pPr>
             <a:r>
-              <a:rPr lang="es-ES" sz="700" b="1" dirty="0">
+              <a:rPr lang="es-ES" sz="1400" b="1" dirty="0">
                 <a:effectLst/>
                 <a:latin typeface="Comic Sans MS" panose="030F0702030302020204" pitchFamily="66" charset="0"/>
                 <a:ea typeface="Calibri" panose="020F0502020204030204" pitchFamily="34" charset="0"/>
                 <a:cs typeface="Times New Roman" panose="02020603050405020304" pitchFamily="18" charset="0"/>
               </a:rPr>
-              <a:t>USUARIO</a:t>
-            </a:r>
-            <a:endParaRPr lang="es-MX" sz="600" b="1" dirty="0">
+              <a:t>GUARDAR</a:t>
+            </a:r>
+            <a:endParaRPr lang="es-MX" sz="1200" b="1" dirty="0">
               <a:effectLst/>
               <a:latin typeface="Arial" panose="020B0604020202020204" pitchFamily="34" charset="0"/>
               <a:ea typeface="Calibri" panose="020F0502020204030204" pitchFamily="34" charset="0"/>
@@ -3477,7 +3482,7 @@
         </p:nvSpPr>
         <p:spPr>
           <a:xfrm>
-            <a:off x="5557044" y="3429001"/>
+            <a:off x="6771482" y="3127772"/>
             <a:ext cx="748506" cy="273843"/>
           </a:xfrm>
           <a:prstGeom prst="roundRect">

</xml_diff>